<commit_message>
minor updates renaming variables and figuring out sign conventions
</commit_message>
<xml_diff>
--- a/Reports/FOSWEC Sign Conventions.pptx
+++ b/Reports/FOSWEC Sign Conventions.pptx
@@ -106,6 +106,11 @@
       </a:defRPr>
     </a:lvl9pPr>
   </p:defaultTextStyle>
+  <p:extLst>
+    <p:ext uri="{EFAFB233-063F-42B5-8137-9DF3F51BA10A}">
+      <p15:sldGuideLst xmlns:p15="http://schemas.microsoft.com/office/powerpoint/2012/main"/>
+    </p:ext>
+  </p:extLst>
 </p:presentation>
 </file>
 
@@ -4324,6 +4329,309 @@
           <a:p>
             <a:pPr algn="ctr"/>
             <a:endParaRPr lang="en-US"/>
+          </a:p>
+        </p:txBody>
+      </p:sp>
+      <p:sp>
+        <p:nvSpPr>
+          <p:cNvPr id="2" name="TextBox 1">
+            <a:extLst>
+              <a:ext uri="{FF2B5EF4-FFF2-40B4-BE49-F238E27FC236}">
+                <a16:creationId xmlns:a16="http://schemas.microsoft.com/office/drawing/2014/main" id="{5D32B029-123A-4341-B4A2-B31AC36BA677}"/>
+              </a:ext>
+            </a:extLst>
+          </p:cNvPr>
+          <p:cNvSpPr txBox="1"/>
+          <p:nvPr/>
+        </p:nvSpPr>
+        <p:spPr>
+          <a:xfrm>
+            <a:off x="3894780" y="3244333"/>
+            <a:ext cx="1974323" cy="369332"/>
+          </a:xfrm>
+          <a:prstGeom prst="rect">
+            <a:avLst/>
+          </a:prstGeom>
+          <a:noFill/>
+        </p:spPr>
+        <p:txBody>
+          <a:bodyPr wrap="none" rtlCol="0">
+            <a:spAutoFit/>
+          </a:bodyPr>
+          <a:lstStyle/>
+          <a:p>
+            <a:r>
+              <a:rPr lang="en-US" dirty="0"/>
+              <a:t>+</a:t>
+            </a:r>
+            <a:r>
+              <a:rPr lang="en-US" dirty="0" err="1"/>
+              <a:t>flap.bowFlap_deg</a:t>
+            </a:r>
+            <a:endParaRPr lang="en-US" dirty="0"/>
+          </a:p>
+        </p:txBody>
+      </p:sp>
+      <p:sp>
+        <p:nvSpPr>
+          <p:cNvPr id="14" name="TextBox 13">
+            <a:extLst>
+              <a:ext uri="{FF2B5EF4-FFF2-40B4-BE49-F238E27FC236}">
+                <a16:creationId xmlns:a16="http://schemas.microsoft.com/office/drawing/2014/main" id="{4474D227-BB60-4746-90ED-97117018B64C}"/>
+              </a:ext>
+            </a:extLst>
+          </p:cNvPr>
+          <p:cNvSpPr txBox="1"/>
+          <p:nvPr/>
+        </p:nvSpPr>
+        <p:spPr>
+          <a:xfrm>
+            <a:off x="9800948" y="3316778"/>
+            <a:ext cx="1823191" cy="369332"/>
+          </a:xfrm>
+          <a:prstGeom prst="rect">
+            <a:avLst/>
+          </a:prstGeom>
+          <a:noFill/>
+        </p:spPr>
+        <p:txBody>
+          <a:bodyPr wrap="none" rtlCol="0">
+            <a:spAutoFit/>
+          </a:bodyPr>
+          <a:lstStyle/>
+          <a:p>
+            <a:r>
+              <a:rPr lang="en-US" dirty="0"/>
+              <a:t>+</a:t>
+            </a:r>
+            <a:r>
+              <a:rPr lang="en-US" dirty="0" err="1"/>
+              <a:t>flap.aftFlap_deg</a:t>
+            </a:r>
+            <a:endParaRPr lang="en-US" dirty="0"/>
+          </a:p>
+        </p:txBody>
+      </p:sp>
+      <p:sp>
+        <p:nvSpPr>
+          <p:cNvPr id="15" name="Arc 14">
+            <a:extLst>
+              <a:ext uri="{FF2B5EF4-FFF2-40B4-BE49-F238E27FC236}">
+                <a16:creationId xmlns:a16="http://schemas.microsoft.com/office/drawing/2014/main" id="{41DEA7D1-60E5-4E88-A8B7-B061ACE49339}"/>
+              </a:ext>
+            </a:extLst>
+          </p:cNvPr>
+          <p:cNvSpPr/>
+          <p:nvPr/>
+        </p:nvSpPr>
+        <p:spPr>
+          <a:xfrm>
+            <a:off x="6241233" y="4653547"/>
+            <a:ext cx="1573626" cy="1573626"/>
+          </a:xfrm>
+          <a:prstGeom prst="arc">
+            <a:avLst>
+              <a:gd name="adj1" fmla="val 5337121"/>
+              <a:gd name="adj2" fmla="val 18971553"/>
+            </a:avLst>
+          </a:prstGeom>
+          <a:ln w="76200">
+            <a:solidFill>
+              <a:srgbClr val="FF0000"/>
+            </a:solidFill>
+            <a:headEnd type="none" w="med" len="med"/>
+            <a:tailEnd type="triangle" w="med" len="med"/>
+          </a:ln>
+        </p:spPr>
+        <p:style>
+          <a:lnRef idx="2">
+            <a:schemeClr val="accent1"/>
+          </a:lnRef>
+          <a:fillRef idx="0">
+            <a:schemeClr val="accent1"/>
+          </a:fillRef>
+          <a:effectRef idx="1">
+            <a:schemeClr val="accent1"/>
+          </a:effectRef>
+          <a:fontRef idx="minor">
+            <a:schemeClr val="tx1"/>
+          </a:fontRef>
+        </p:style>
+        <p:txBody>
+          <a:bodyPr rtlCol="0" anchor="ctr"/>
+          <a:lstStyle/>
+          <a:p>
+            <a:pPr algn="ctr"/>
+            <a:endParaRPr lang="en-US"/>
+          </a:p>
+        </p:txBody>
+      </p:sp>
+      <p:sp>
+        <p:nvSpPr>
+          <p:cNvPr id="16" name="Arc 15">
+            <a:extLst>
+              <a:ext uri="{FF2B5EF4-FFF2-40B4-BE49-F238E27FC236}">
+                <a16:creationId xmlns:a16="http://schemas.microsoft.com/office/drawing/2014/main" id="{4DEF848E-5BC2-407D-AAEB-A284717DDDE7}"/>
+              </a:ext>
+            </a:extLst>
+          </p:cNvPr>
+          <p:cNvSpPr/>
+          <p:nvPr/>
+        </p:nvSpPr>
+        <p:spPr>
+          <a:xfrm>
+            <a:off x="4667607" y="4618768"/>
+            <a:ext cx="1573626" cy="1573626"/>
+          </a:xfrm>
+          <a:prstGeom prst="arc">
+            <a:avLst>
+              <a:gd name="adj1" fmla="val 5337121"/>
+              <a:gd name="adj2" fmla="val 18971553"/>
+            </a:avLst>
+          </a:prstGeom>
+          <a:ln w="76200">
+            <a:solidFill>
+              <a:srgbClr val="FF0000"/>
+            </a:solidFill>
+            <a:headEnd type="none" w="med" len="med"/>
+            <a:tailEnd type="triangle" w="med" len="med"/>
+          </a:ln>
+        </p:spPr>
+        <p:style>
+          <a:lnRef idx="2">
+            <a:schemeClr val="accent1"/>
+          </a:lnRef>
+          <a:fillRef idx="0">
+            <a:schemeClr val="accent1"/>
+          </a:fillRef>
+          <a:effectRef idx="1">
+            <a:schemeClr val="accent1"/>
+          </a:effectRef>
+          <a:fontRef idx="minor">
+            <a:schemeClr val="tx1"/>
+          </a:fontRef>
+        </p:style>
+        <p:txBody>
+          <a:bodyPr rtlCol="0" anchor="ctr"/>
+          <a:lstStyle/>
+          <a:p>
+            <a:pPr algn="ctr"/>
+            <a:endParaRPr lang="en-US"/>
+          </a:p>
+        </p:txBody>
+      </p:sp>
+      <p:sp>
+        <p:nvSpPr>
+          <p:cNvPr id="3" name="TextBox 2">
+            <a:extLst>
+              <a:ext uri="{FF2B5EF4-FFF2-40B4-BE49-F238E27FC236}">
+                <a16:creationId xmlns:a16="http://schemas.microsoft.com/office/drawing/2014/main" id="{4362776E-65D6-4497-BF7C-B93877D2AB15}"/>
+              </a:ext>
+            </a:extLst>
+          </p:cNvPr>
+          <p:cNvSpPr txBox="1"/>
+          <p:nvPr/>
+        </p:nvSpPr>
+        <p:spPr>
+          <a:xfrm>
+            <a:off x="3994171" y="4265317"/>
+            <a:ext cx="2074158" cy="369332"/>
+          </a:xfrm>
+          <a:prstGeom prst="rect">
+            <a:avLst/>
+          </a:prstGeom>
+          <a:noFill/>
+        </p:spPr>
+        <p:txBody>
+          <a:bodyPr wrap="none" rtlCol="0">
+            <a:spAutoFit/>
+          </a:bodyPr>
+          <a:lstStyle/>
+          <a:p>
+            <a:r>
+              <a:rPr lang="en-US" dirty="0"/>
+              <a:t>+</a:t>
+            </a:r>
+            <a:r>
+              <a:rPr lang="en-US" dirty="0" err="1"/>
+              <a:t>motor.bowPos_rad</a:t>
+            </a:r>
+            <a:endParaRPr lang="en-US" dirty="0"/>
+          </a:p>
+        </p:txBody>
+      </p:sp>
+      <p:sp>
+        <p:nvSpPr>
+          <p:cNvPr id="19" name="TextBox 18">
+            <a:extLst>
+              <a:ext uri="{FF2B5EF4-FFF2-40B4-BE49-F238E27FC236}">
+                <a16:creationId xmlns:a16="http://schemas.microsoft.com/office/drawing/2014/main" id="{272F1DBF-D43A-44BB-8F33-D36822932FED}"/>
+              </a:ext>
+            </a:extLst>
+          </p:cNvPr>
+          <p:cNvSpPr txBox="1"/>
+          <p:nvPr/>
+        </p:nvSpPr>
+        <p:spPr>
+          <a:xfrm>
+            <a:off x="6096000" y="4259994"/>
+            <a:ext cx="1923027" cy="369332"/>
+          </a:xfrm>
+          <a:prstGeom prst="rect">
+            <a:avLst/>
+          </a:prstGeom>
+          <a:noFill/>
+        </p:spPr>
+        <p:txBody>
+          <a:bodyPr wrap="none" rtlCol="0">
+            <a:spAutoFit/>
+          </a:bodyPr>
+          <a:lstStyle/>
+          <a:p>
+            <a:r>
+              <a:rPr lang="en-US" dirty="0"/>
+              <a:t>+</a:t>
+            </a:r>
+            <a:r>
+              <a:rPr lang="en-US" dirty="0" err="1"/>
+              <a:t>motor.aftPos_rad</a:t>
+            </a:r>
+            <a:endParaRPr lang="en-US" dirty="0"/>
+          </a:p>
+        </p:txBody>
+      </p:sp>
+      <p:sp>
+        <p:nvSpPr>
+          <p:cNvPr id="4" name="TextBox 3">
+            <a:extLst>
+              <a:ext uri="{FF2B5EF4-FFF2-40B4-BE49-F238E27FC236}">
+                <a16:creationId xmlns:a16="http://schemas.microsoft.com/office/drawing/2014/main" id="{DE716812-80FB-48F4-BD8B-157DF9B0A90B}"/>
+              </a:ext>
+            </a:extLst>
+          </p:cNvPr>
+          <p:cNvSpPr txBox="1"/>
+          <p:nvPr/>
+        </p:nvSpPr>
+        <p:spPr>
+          <a:xfrm>
+            <a:off x="3894780" y="6432672"/>
+            <a:ext cx="3771482" cy="369332"/>
+          </a:xfrm>
+          <a:prstGeom prst="rect">
+            <a:avLst/>
+          </a:prstGeom>
+          <a:noFill/>
+        </p:spPr>
+        <p:txBody>
+          <a:bodyPr wrap="none" rtlCol="0">
+            <a:spAutoFit/>
+          </a:bodyPr>
+          <a:lstStyle/>
+          <a:p>
+            <a:r>
+              <a:rPr lang="en-US" dirty="0"/>
+              <a:t>Cycling low power resets position zero</a:t>
+            </a:r>
           </a:p>
         </p:txBody>
       </p:sp>

</xml_diff>

<commit_message>
minor tweaks for dryFOSWEC2 data collection phase.
</commit_message>
<xml_diff>
--- a/Reports/FOSWEC Sign Conventions.pptx
+++ b/Reports/FOSWEC Sign Conventions.pptx
@@ -261,7 +261,7 @@
           <a:p>
             <a:fld id="{865EC1B6-1FCF-4ABE-8ADB-AAACAC19E9EC}" type="datetimeFigureOut">
               <a:rPr lang="en-US" smtClean="0"/>
-              <a:t>12/18/2024</a:t>
+              <a:t>12/19/2024</a:t>
             </a:fld>
             <a:endParaRPr lang="en-US"/>
           </a:p>
@@ -459,7 +459,7 @@
           <a:p>
             <a:fld id="{865EC1B6-1FCF-4ABE-8ADB-AAACAC19E9EC}" type="datetimeFigureOut">
               <a:rPr lang="en-US" smtClean="0"/>
-              <a:t>12/18/2024</a:t>
+              <a:t>12/19/2024</a:t>
             </a:fld>
             <a:endParaRPr lang="en-US"/>
           </a:p>
@@ -667,7 +667,7 @@
           <a:p>
             <a:fld id="{865EC1B6-1FCF-4ABE-8ADB-AAACAC19E9EC}" type="datetimeFigureOut">
               <a:rPr lang="en-US" smtClean="0"/>
-              <a:t>12/18/2024</a:t>
+              <a:t>12/19/2024</a:t>
             </a:fld>
             <a:endParaRPr lang="en-US"/>
           </a:p>
@@ -865,7 +865,7 @@
           <a:p>
             <a:fld id="{865EC1B6-1FCF-4ABE-8ADB-AAACAC19E9EC}" type="datetimeFigureOut">
               <a:rPr lang="en-US" smtClean="0"/>
-              <a:t>12/18/2024</a:t>
+              <a:t>12/19/2024</a:t>
             </a:fld>
             <a:endParaRPr lang="en-US"/>
           </a:p>
@@ -1140,7 +1140,7 @@
           <a:p>
             <a:fld id="{865EC1B6-1FCF-4ABE-8ADB-AAACAC19E9EC}" type="datetimeFigureOut">
               <a:rPr lang="en-US" smtClean="0"/>
-              <a:t>12/18/2024</a:t>
+              <a:t>12/19/2024</a:t>
             </a:fld>
             <a:endParaRPr lang="en-US"/>
           </a:p>
@@ -1405,7 +1405,7 @@
           <a:p>
             <a:fld id="{865EC1B6-1FCF-4ABE-8ADB-AAACAC19E9EC}" type="datetimeFigureOut">
               <a:rPr lang="en-US" smtClean="0"/>
-              <a:t>12/18/2024</a:t>
+              <a:t>12/19/2024</a:t>
             </a:fld>
             <a:endParaRPr lang="en-US"/>
           </a:p>
@@ -1817,7 +1817,7 @@
           <a:p>
             <a:fld id="{865EC1B6-1FCF-4ABE-8ADB-AAACAC19E9EC}" type="datetimeFigureOut">
               <a:rPr lang="en-US" smtClean="0"/>
-              <a:t>12/18/2024</a:t>
+              <a:t>12/19/2024</a:t>
             </a:fld>
             <a:endParaRPr lang="en-US"/>
           </a:p>
@@ -1958,7 +1958,7 @@
           <a:p>
             <a:fld id="{865EC1B6-1FCF-4ABE-8ADB-AAACAC19E9EC}" type="datetimeFigureOut">
               <a:rPr lang="en-US" smtClean="0"/>
-              <a:t>12/18/2024</a:t>
+              <a:t>12/19/2024</a:t>
             </a:fld>
             <a:endParaRPr lang="en-US"/>
           </a:p>
@@ -2071,7 +2071,7 @@
           <a:p>
             <a:fld id="{865EC1B6-1FCF-4ABE-8ADB-AAACAC19E9EC}" type="datetimeFigureOut">
               <a:rPr lang="en-US" smtClean="0"/>
-              <a:t>12/18/2024</a:t>
+              <a:t>12/19/2024</a:t>
             </a:fld>
             <a:endParaRPr lang="en-US"/>
           </a:p>
@@ -2382,7 +2382,7 @@
           <a:p>
             <a:fld id="{865EC1B6-1FCF-4ABE-8ADB-AAACAC19E9EC}" type="datetimeFigureOut">
               <a:rPr lang="en-US" smtClean="0"/>
-              <a:t>12/18/2024</a:t>
+              <a:t>12/19/2024</a:t>
             </a:fld>
             <a:endParaRPr lang="en-US"/>
           </a:p>
@@ -2670,7 +2670,7 @@
           <a:p>
             <a:fld id="{865EC1B6-1FCF-4ABE-8ADB-AAACAC19E9EC}" type="datetimeFigureOut">
               <a:rPr lang="en-US" smtClean="0"/>
-              <a:t>12/18/2024</a:t>
+              <a:t>12/19/2024</a:t>
             </a:fld>
             <a:endParaRPr lang="en-US"/>
           </a:p>
@@ -2911,7 +2911,7 @@
           <a:p>
             <a:fld id="{865EC1B6-1FCF-4ABE-8ADB-AAACAC19E9EC}" type="datetimeFigureOut">
               <a:rPr lang="en-US" smtClean="0"/>
-              <a:t>12/18/2024</a:t>
+              <a:t>12/19/2024</a:t>
             </a:fld>
             <a:endParaRPr lang="en-US"/>
           </a:p>
@@ -4426,8 +4426,8 @@
         </p:nvSpPr>
         <p:spPr>
           <a:xfrm>
-            <a:off x="6241233" y="4653547"/>
-            <a:ext cx="1573626" cy="1573626"/>
+            <a:off x="6347829" y="4815609"/>
+            <a:ext cx="1242643" cy="1242643"/>
           </a:xfrm>
           <a:prstGeom prst="arc">
             <a:avLst>
@@ -4468,10 +4468,205 @@
       </p:sp>
       <p:sp>
         <p:nvSpPr>
-          <p:cNvPr id="16" name="Arc 15">
-            <a:extLst>
-              <a:ext uri="{FF2B5EF4-FFF2-40B4-BE49-F238E27FC236}">
-                <a16:creationId xmlns:a16="http://schemas.microsoft.com/office/drawing/2014/main" id="{4DEF848E-5BC2-407D-AAEB-A284717DDDE7}"/>
+          <p:cNvPr id="3" name="TextBox 2">
+            <a:extLst>
+              <a:ext uri="{FF2B5EF4-FFF2-40B4-BE49-F238E27FC236}">
+                <a16:creationId xmlns:a16="http://schemas.microsoft.com/office/drawing/2014/main" id="{4362776E-65D6-4497-BF7C-B93877D2AB15}"/>
+              </a:ext>
+            </a:extLst>
+          </p:cNvPr>
+          <p:cNvSpPr txBox="1"/>
+          <p:nvPr/>
+        </p:nvSpPr>
+        <p:spPr>
+          <a:xfrm>
+            <a:off x="3774778" y="4419783"/>
+            <a:ext cx="2074158" cy="369332"/>
+          </a:xfrm>
+          <a:prstGeom prst="rect">
+            <a:avLst/>
+          </a:prstGeom>
+          <a:noFill/>
+        </p:spPr>
+        <p:txBody>
+          <a:bodyPr wrap="none" rtlCol="0">
+            <a:spAutoFit/>
+          </a:bodyPr>
+          <a:lstStyle/>
+          <a:p>
+            <a:r>
+              <a:rPr lang="en-US" dirty="0"/>
+              <a:t>+</a:t>
+            </a:r>
+            <a:r>
+              <a:rPr lang="en-US" dirty="0" err="1"/>
+              <a:t>motor.bowPos_rad</a:t>
+            </a:r>
+            <a:endParaRPr lang="en-US" dirty="0"/>
+          </a:p>
+        </p:txBody>
+      </p:sp>
+      <p:sp>
+        <p:nvSpPr>
+          <p:cNvPr id="19" name="TextBox 18">
+            <a:extLst>
+              <a:ext uri="{FF2B5EF4-FFF2-40B4-BE49-F238E27FC236}">
+                <a16:creationId xmlns:a16="http://schemas.microsoft.com/office/drawing/2014/main" id="{272F1DBF-D43A-44BB-8F33-D36822932FED}"/>
+              </a:ext>
+            </a:extLst>
+          </p:cNvPr>
+          <p:cNvSpPr txBox="1"/>
+          <p:nvPr/>
+        </p:nvSpPr>
+        <p:spPr>
+          <a:xfrm>
+            <a:off x="6129857" y="4370156"/>
+            <a:ext cx="1923027" cy="369332"/>
+          </a:xfrm>
+          <a:prstGeom prst="rect">
+            <a:avLst/>
+          </a:prstGeom>
+          <a:noFill/>
+        </p:spPr>
+        <p:txBody>
+          <a:bodyPr wrap="none" rtlCol="0">
+            <a:spAutoFit/>
+          </a:bodyPr>
+          <a:lstStyle/>
+          <a:p>
+            <a:r>
+              <a:rPr lang="en-US" dirty="0"/>
+              <a:t>+</a:t>
+            </a:r>
+            <a:r>
+              <a:rPr lang="en-US" dirty="0" err="1"/>
+              <a:t>motor.aftPos_rad</a:t>
+            </a:r>
+            <a:endParaRPr lang="en-US" dirty="0"/>
+          </a:p>
+        </p:txBody>
+      </p:sp>
+      <p:sp>
+        <p:nvSpPr>
+          <p:cNvPr id="4" name="TextBox 3">
+            <a:extLst>
+              <a:ext uri="{FF2B5EF4-FFF2-40B4-BE49-F238E27FC236}">
+                <a16:creationId xmlns:a16="http://schemas.microsoft.com/office/drawing/2014/main" id="{DE716812-80FB-48F4-BD8B-157DF9B0A90B}"/>
+              </a:ext>
+            </a:extLst>
+          </p:cNvPr>
+          <p:cNvSpPr txBox="1"/>
+          <p:nvPr/>
+        </p:nvSpPr>
+        <p:spPr>
+          <a:xfrm>
+            <a:off x="3894780" y="6432672"/>
+            <a:ext cx="3771482" cy="369332"/>
+          </a:xfrm>
+          <a:prstGeom prst="rect">
+            <a:avLst/>
+          </a:prstGeom>
+          <a:noFill/>
+        </p:spPr>
+        <p:txBody>
+          <a:bodyPr wrap="none" rtlCol="0">
+            <a:spAutoFit/>
+          </a:bodyPr>
+          <a:lstStyle/>
+          <a:p>
+            <a:r>
+              <a:rPr lang="en-US" dirty="0"/>
+              <a:t>Cycling low power resets position zero</a:t>
+            </a:r>
+          </a:p>
+        </p:txBody>
+      </p:sp>
+      <p:sp>
+        <p:nvSpPr>
+          <p:cNvPr id="17" name="TextBox 16">
+            <a:extLst>
+              <a:ext uri="{FF2B5EF4-FFF2-40B4-BE49-F238E27FC236}">
+                <a16:creationId xmlns:a16="http://schemas.microsoft.com/office/drawing/2014/main" id="{10D3FE3C-2F80-4D32-BD5A-171142C8A035}"/>
+              </a:ext>
+            </a:extLst>
+          </p:cNvPr>
+          <p:cNvSpPr txBox="1"/>
+          <p:nvPr/>
+        </p:nvSpPr>
+        <p:spPr>
+          <a:xfrm>
+            <a:off x="3767784" y="4156607"/>
+            <a:ext cx="2423740" cy="369332"/>
+          </a:xfrm>
+          <a:prstGeom prst="rect">
+            <a:avLst/>
+          </a:prstGeom>
+          <a:noFill/>
+        </p:spPr>
+        <p:txBody>
+          <a:bodyPr wrap="none" rtlCol="0">
+            <a:spAutoFit/>
+          </a:bodyPr>
+          <a:lstStyle/>
+          <a:p>
+            <a:r>
+              <a:rPr lang="en-US" dirty="0"/>
+              <a:t>+</a:t>
+            </a:r>
+            <a:r>
+              <a:rPr lang="en-US" dirty="0" err="1"/>
+              <a:t>motor.bowTorque_Nm</a:t>
+            </a:r>
+            <a:endParaRPr lang="en-US" dirty="0"/>
+          </a:p>
+        </p:txBody>
+      </p:sp>
+      <p:sp>
+        <p:nvSpPr>
+          <p:cNvPr id="20" name="TextBox 19">
+            <a:extLst>
+              <a:ext uri="{FF2B5EF4-FFF2-40B4-BE49-F238E27FC236}">
+                <a16:creationId xmlns:a16="http://schemas.microsoft.com/office/drawing/2014/main" id="{E988CB5A-6B91-4233-9ECD-12F26250975F}"/>
+              </a:ext>
+            </a:extLst>
+          </p:cNvPr>
+          <p:cNvSpPr txBox="1"/>
+          <p:nvPr/>
+        </p:nvSpPr>
+        <p:spPr>
+          <a:xfrm>
+            <a:off x="6123076" y="4128580"/>
+            <a:ext cx="2272610" cy="369332"/>
+          </a:xfrm>
+          <a:prstGeom prst="rect">
+            <a:avLst/>
+          </a:prstGeom>
+          <a:noFill/>
+        </p:spPr>
+        <p:txBody>
+          <a:bodyPr wrap="none" rtlCol="0">
+            <a:spAutoFit/>
+          </a:bodyPr>
+          <a:lstStyle/>
+          <a:p>
+            <a:r>
+              <a:rPr lang="en-US" dirty="0"/>
+              <a:t>+</a:t>
+            </a:r>
+            <a:r>
+              <a:rPr lang="en-US" dirty="0" err="1"/>
+              <a:t>motor.aftTorque_Nm</a:t>
+            </a:r>
+            <a:endParaRPr lang="en-US" dirty="0"/>
+          </a:p>
+        </p:txBody>
+      </p:sp>
+      <p:sp>
+        <p:nvSpPr>
+          <p:cNvPr id="21" name="Arc 20">
+            <a:extLst>
+              <a:ext uri="{FF2B5EF4-FFF2-40B4-BE49-F238E27FC236}">
+                <a16:creationId xmlns:a16="http://schemas.microsoft.com/office/drawing/2014/main" id="{9B52DFF5-79CD-4AE9-A723-1EA63FA8D9B3}"/>
               </a:ext>
             </a:extLst>
           </p:cNvPr>
@@ -4480,8 +4675,8 @@
         </p:nvSpPr>
         <p:spPr>
           <a:xfrm>
-            <a:off x="4667607" y="4618768"/>
-            <a:ext cx="1573626" cy="1573626"/>
+            <a:off x="4793830" y="4799642"/>
+            <a:ext cx="1242643" cy="1242643"/>
           </a:xfrm>
           <a:prstGeom prst="arc">
             <a:avLst>
@@ -4517,121 +4712,6 @@
           <a:p>
             <a:pPr algn="ctr"/>
             <a:endParaRPr lang="en-US"/>
-          </a:p>
-        </p:txBody>
-      </p:sp>
-      <p:sp>
-        <p:nvSpPr>
-          <p:cNvPr id="3" name="TextBox 2">
-            <a:extLst>
-              <a:ext uri="{FF2B5EF4-FFF2-40B4-BE49-F238E27FC236}">
-                <a16:creationId xmlns:a16="http://schemas.microsoft.com/office/drawing/2014/main" id="{4362776E-65D6-4497-BF7C-B93877D2AB15}"/>
-              </a:ext>
-            </a:extLst>
-          </p:cNvPr>
-          <p:cNvSpPr txBox="1"/>
-          <p:nvPr/>
-        </p:nvSpPr>
-        <p:spPr>
-          <a:xfrm>
-            <a:off x="3994171" y="4265317"/>
-            <a:ext cx="2074158" cy="369332"/>
-          </a:xfrm>
-          <a:prstGeom prst="rect">
-            <a:avLst/>
-          </a:prstGeom>
-          <a:noFill/>
-        </p:spPr>
-        <p:txBody>
-          <a:bodyPr wrap="none" rtlCol="0">
-            <a:spAutoFit/>
-          </a:bodyPr>
-          <a:lstStyle/>
-          <a:p>
-            <a:r>
-              <a:rPr lang="en-US" dirty="0"/>
-              <a:t>+</a:t>
-            </a:r>
-            <a:r>
-              <a:rPr lang="en-US" dirty="0" err="1"/>
-              <a:t>motor.bowPos_rad</a:t>
-            </a:r>
-            <a:endParaRPr lang="en-US" dirty="0"/>
-          </a:p>
-        </p:txBody>
-      </p:sp>
-      <p:sp>
-        <p:nvSpPr>
-          <p:cNvPr id="19" name="TextBox 18">
-            <a:extLst>
-              <a:ext uri="{FF2B5EF4-FFF2-40B4-BE49-F238E27FC236}">
-                <a16:creationId xmlns:a16="http://schemas.microsoft.com/office/drawing/2014/main" id="{272F1DBF-D43A-44BB-8F33-D36822932FED}"/>
-              </a:ext>
-            </a:extLst>
-          </p:cNvPr>
-          <p:cNvSpPr txBox="1"/>
-          <p:nvPr/>
-        </p:nvSpPr>
-        <p:spPr>
-          <a:xfrm>
-            <a:off x="6096000" y="4259994"/>
-            <a:ext cx="1923027" cy="369332"/>
-          </a:xfrm>
-          <a:prstGeom prst="rect">
-            <a:avLst/>
-          </a:prstGeom>
-          <a:noFill/>
-        </p:spPr>
-        <p:txBody>
-          <a:bodyPr wrap="none" rtlCol="0">
-            <a:spAutoFit/>
-          </a:bodyPr>
-          <a:lstStyle/>
-          <a:p>
-            <a:r>
-              <a:rPr lang="en-US" dirty="0"/>
-              <a:t>+</a:t>
-            </a:r>
-            <a:r>
-              <a:rPr lang="en-US" dirty="0" err="1"/>
-              <a:t>motor.aftPos_rad</a:t>
-            </a:r>
-            <a:endParaRPr lang="en-US" dirty="0"/>
-          </a:p>
-        </p:txBody>
-      </p:sp>
-      <p:sp>
-        <p:nvSpPr>
-          <p:cNvPr id="4" name="TextBox 3">
-            <a:extLst>
-              <a:ext uri="{FF2B5EF4-FFF2-40B4-BE49-F238E27FC236}">
-                <a16:creationId xmlns:a16="http://schemas.microsoft.com/office/drawing/2014/main" id="{DE716812-80FB-48F4-BD8B-157DF9B0A90B}"/>
-              </a:ext>
-            </a:extLst>
-          </p:cNvPr>
-          <p:cNvSpPr txBox="1"/>
-          <p:nvPr/>
-        </p:nvSpPr>
-        <p:spPr>
-          <a:xfrm>
-            <a:off x="3894780" y="6432672"/>
-            <a:ext cx="3771482" cy="369332"/>
-          </a:xfrm>
-          <a:prstGeom prst="rect">
-            <a:avLst/>
-          </a:prstGeom>
-          <a:noFill/>
-        </p:spPr>
-        <p:txBody>
-          <a:bodyPr wrap="none" rtlCol="0">
-            <a:spAutoFit/>
-          </a:bodyPr>
-          <a:lstStyle/>
-          <a:p>
-            <a:r>
-              <a:rPr lang="en-US" dirty="0"/>
-              <a:t>Cycling low power resets position zero</a:t>
-            </a:r>
           </a:p>
         </p:txBody>
       </p:sp>

</xml_diff>